<commit_message>
Ready for Day 1 2023
</commit_message>
<xml_diff>
--- a/Day 1/Slides/00-Preclass-loop.pptx
+++ b/Day 1/Slides/00-Preclass-loop.pptx
@@ -5,11 +5,12 @@
     <p:sldMasterId id="2147483648" r:id="rId1"/>
   </p:sldMasterIdLst>
   <p:notesMasterIdLst>
-    <p:notesMasterId r:id="rId4"/>
+    <p:notesMasterId r:id="rId5"/>
   </p:notesMasterIdLst>
   <p:sldIdLst>
     <p:sldId id="259" r:id="rId2"/>
     <p:sldId id="260" r:id="rId3"/>
+    <p:sldId id="261" r:id="rId4"/>
   </p:sldIdLst>
   <p:sldSz cx="24384000" cy="13716000"/>
   <p:notesSz cx="6858000" cy="9144000"/>
@@ -322,13 +323,82 @@
 <file path=ppt/revisionInfo.xml><?xml version="1.0" encoding="utf-8"?>
 <p1510:revInfo xmlns:a="http://schemas.openxmlformats.org/drawingml/2006/main" xmlns:r="http://schemas.openxmlformats.org/officeDocument/2006/relationships" xmlns:p1510="http://schemas.microsoft.com/office/powerpoint/2015/10/main">
   <p1510:revLst>
-    <p1510:client id="{6912499A-2092-4D3B-ADE7-B5DBE1818A09}" v="17" dt="2022-03-05T11:41:36.258"/>
+    <p1510:client id="{0DAFB321-5DDB-9647-AD1A-645241123028}" v="4" dt="2023-03-01T16:27:12.736"/>
   </p1510:revLst>
 </p1510:revInfo>
 </file>
 
 <file path=ppt/changesInfos/changesInfo1.xml><?xml version="1.0" encoding="utf-8"?>
 <pc:chgInfo xmlns:a="http://schemas.openxmlformats.org/drawingml/2006/main" xmlns:r="http://schemas.openxmlformats.org/officeDocument/2006/relationships" xmlns:ac="http://schemas.microsoft.com/office/drawing/2013/main/command" xmlns:pc="http://schemas.microsoft.com/office/powerpoint/2013/main/command">
+  <pc:docChgLst>
+    <pc:chgData name="Lukas Wallrich (Staff)" userId="74c9ee81-4c0d-413a-a571-5c8398ac27a1" providerId="ADAL" clId="{0DAFB321-5DDB-9647-AD1A-645241123028}"/>
+    <pc:docChg chg="undo custSel addSld delSld modSld">
+      <pc:chgData name="Lukas Wallrich (Staff)" userId="74c9ee81-4c0d-413a-a571-5c8398ac27a1" providerId="ADAL" clId="{0DAFB321-5DDB-9647-AD1A-645241123028}" dt="2023-03-01T17:20:25.444" v="536" actId="20577"/>
+      <pc:docMkLst>
+        <pc:docMk/>
+      </pc:docMkLst>
+      <pc:sldChg chg="modSp mod">
+        <pc:chgData name="Lukas Wallrich (Staff)" userId="74c9ee81-4c0d-413a-a571-5c8398ac27a1" providerId="ADAL" clId="{0DAFB321-5DDB-9647-AD1A-645241123028}" dt="2023-03-01T16:27:59.010" v="522" actId="20577"/>
+        <pc:sldMkLst>
+          <pc:docMk/>
+          <pc:sldMk cId="1005910225" sldId="259"/>
+        </pc:sldMkLst>
+        <pc:spChg chg="mod">
+          <ac:chgData name="Lukas Wallrich (Staff)" userId="74c9ee81-4c0d-413a-a571-5c8398ac27a1" providerId="ADAL" clId="{0DAFB321-5DDB-9647-AD1A-645241123028}" dt="2023-03-01T16:27:59.010" v="522" actId="20577"/>
+          <ac:spMkLst>
+            <pc:docMk/>
+            <pc:sldMk cId="1005910225" sldId="259"/>
+            <ac:spMk id="4" creationId="{89FE50A6-840F-4316-B746-00C349D89300}"/>
+          </ac:spMkLst>
+        </pc:spChg>
+      </pc:sldChg>
+      <pc:sldChg chg="modSp mod">
+        <pc:chgData name="Lukas Wallrich (Staff)" userId="74c9ee81-4c0d-413a-a571-5c8398ac27a1" providerId="ADAL" clId="{0DAFB321-5DDB-9647-AD1A-645241123028}" dt="2023-03-01T17:20:25.444" v="536" actId="20577"/>
+        <pc:sldMkLst>
+          <pc:docMk/>
+          <pc:sldMk cId="1649883713" sldId="260"/>
+        </pc:sldMkLst>
+        <pc:spChg chg="mod">
+          <ac:chgData name="Lukas Wallrich (Staff)" userId="74c9ee81-4c0d-413a-a571-5c8398ac27a1" providerId="ADAL" clId="{0DAFB321-5DDB-9647-AD1A-645241123028}" dt="2023-03-01T17:20:25.444" v="536" actId="20577"/>
+          <ac:spMkLst>
+            <pc:docMk/>
+            <pc:sldMk cId="1649883713" sldId="260"/>
+            <ac:spMk id="2" creationId="{E675090F-BE6E-4FE7-8EEE-BC74CFB9A1F3}"/>
+          </ac:spMkLst>
+        </pc:spChg>
+      </pc:sldChg>
+      <pc:sldChg chg="addSp modSp new mod">
+        <pc:chgData name="Lukas Wallrich (Staff)" userId="74c9ee81-4c0d-413a-a571-5c8398ac27a1" providerId="ADAL" clId="{0DAFB321-5DDB-9647-AD1A-645241123028}" dt="2023-03-01T16:27:12.728" v="486" actId="20577"/>
+        <pc:sldMkLst>
+          <pc:docMk/>
+          <pc:sldMk cId="4155338529" sldId="261"/>
+        </pc:sldMkLst>
+        <pc:spChg chg="add mod">
+          <ac:chgData name="Lukas Wallrich (Staff)" userId="74c9ee81-4c0d-413a-a571-5c8398ac27a1" providerId="ADAL" clId="{0DAFB321-5DDB-9647-AD1A-645241123028}" dt="2023-03-01T16:27:12.728" v="486" actId="20577"/>
+          <ac:spMkLst>
+            <pc:docMk/>
+            <pc:sldMk cId="4155338529" sldId="261"/>
+            <ac:spMk id="2" creationId="{2E572E4C-0056-8CD2-9BC3-E6BC32ED6B23}"/>
+          </ac:spMkLst>
+        </pc:spChg>
+      </pc:sldChg>
+      <pc:sldChg chg="modSp add del mod">
+        <pc:chgData name="Lukas Wallrich (Staff)" userId="74c9ee81-4c0d-413a-a571-5c8398ac27a1" providerId="ADAL" clId="{0DAFB321-5DDB-9647-AD1A-645241123028}" dt="2023-03-01T16:27:04.642" v="477" actId="2696"/>
+        <pc:sldMkLst>
+          <pc:docMk/>
+          <pc:sldMk cId="2865160879" sldId="262"/>
+        </pc:sldMkLst>
+        <pc:spChg chg="mod">
+          <ac:chgData name="Lukas Wallrich (Staff)" userId="74c9ee81-4c0d-413a-a571-5c8398ac27a1" providerId="ADAL" clId="{0DAFB321-5DDB-9647-AD1A-645241123028}" dt="2023-03-01T16:26:29.533" v="474" actId="1076"/>
+          <ac:spMkLst>
+            <pc:docMk/>
+            <pc:sldMk cId="2865160879" sldId="262"/>
+            <ac:spMk id="2" creationId="{2E572E4C-0056-8CD2-9BC3-E6BC32ED6B23}"/>
+          </ac:spMkLst>
+        </pc:spChg>
+      </pc:sldChg>
+    </pc:docChg>
+  </pc:docChgLst>
   <pc:docChgLst>
     <pc:chgData name="Lukas Wallrich (Staff)" userId="74c9ee81-4c0d-413a-a571-5c8398ac27a1" providerId="ADAL" clId="{6912499A-2092-4D3B-ADE7-B5DBE1818A09}"/>
     <pc:docChg chg="custSel addSld delSld modSld sldOrd modMainMaster">
@@ -2091,7 +2161,7 @@
                 <a:cs typeface="Gill Sans"/>
                 <a:sym typeface="Gill Sans"/>
               </a:rPr>
-              <a:t>Birkbeck OP R Training Day 1:</a:t>
+              <a:t>Birkbeck BEI R Training Day 1:</a:t>
             </a:r>
           </a:p>
           <a:p>
@@ -2134,7 +2204,18 @@
               <a:tabLst/>
             </a:pPr>
             <a:r>
-              <a:rPr kumimoji="0" lang="en-US" sz="5800" b="1" i="0" u="none" strike="noStrike" cap="none" spc="0" normalizeH="0" baseline="0" dirty="0">
+              <a:rPr lang="en-US" b="1">
+                <a:solidFill>
+                  <a:schemeClr val="tx2">
+                    <a:lumMod val="60000"/>
+                    <a:lumOff val="40000"/>
+                  </a:schemeClr>
+                </a:solidFill>
+              </a:rPr>
+              <a:t>2</a:t>
+            </a:r>
+            <a:r>
+              <a:rPr kumimoji="0" lang="en-US" sz="5800" b="1" i="0" u="none" strike="noStrike" cap="none" spc="0" normalizeH="0" baseline="0">
                 <a:ln>
                   <a:noFill/>
                 </a:ln>
@@ -2151,7 +2232,7 @@
                 <a:cs typeface="Gill Sans"/>
                 <a:sym typeface="Gill Sans"/>
               </a:rPr>
-              <a:t>17 March 2022</a:t>
+              <a:t> March 2023</a:t>
             </a:r>
             <a:endParaRPr kumimoji="0" lang="en-GB" sz="5800" b="1" i="0" u="none" strike="noStrike" cap="none" spc="0" normalizeH="0" baseline="0" dirty="0">
               <a:ln>
@@ -2452,7 +2533,7 @@
             </a:br>
             <a:r>
               <a:rPr lang="en-US" b="1" dirty="0"/>
-              <a:t>(see email)</a:t>
+              <a:t>(see next slide)</a:t>
             </a:r>
           </a:p>
           <a:p>
@@ -2462,7 +2543,15 @@
             </a:pPr>
             <a:r>
               <a:rPr lang="en-US" b="1" dirty="0"/>
-              <a:t>Open Day 1.Rproj</a:t>
+              <a:t>Open R </a:t>
+            </a:r>
+            <a:r>
+              <a:rPr lang="en-US" b="1" dirty="0" err="1"/>
+              <a:t>workshop.Rproj</a:t>
+            </a:r>
+            <a:r>
+              <a:rPr lang="en-US" b="1" dirty="0"/>
+              <a:t> in RStudio</a:t>
             </a:r>
           </a:p>
           <a:p>
@@ -2478,7 +2567,18 @@
               <a:rPr lang="en-US" b="1" dirty="0" err="1"/>
               <a:t>get_started.R</a:t>
             </a:r>
-            <a:endParaRPr lang="en-US" b="1" dirty="0"/>
+            <a:r>
+              <a:rPr lang="en-US" b="1" dirty="0"/>
+              <a:t> in </a:t>
+            </a:r>
+            <a:r>
+              <a:rPr lang="en-US" b="1" i="1" dirty="0"/>
+              <a:t>Files </a:t>
+            </a:r>
+            <a:r>
+              <a:rPr lang="en-US" b="1" dirty="0"/>
+              <a:t>pane </a:t>
+            </a:r>
           </a:p>
           <a:p>
             <a:pPr marL="3600000" lvl="3" indent="-1143000" algn="l">
@@ -2503,6 +2603,270 @@
     <p:extLst>
       <p:ext uri="{BB962C8B-B14F-4D97-AF65-F5344CB8AC3E}">
         <p14:creationId xmlns:p14="http://schemas.microsoft.com/office/powerpoint/2010/main" val="1649883713"/>
+      </p:ext>
+    </p:extLst>
+  </p:cSld>
+  <p:clrMapOvr>
+    <a:masterClrMapping/>
+  </p:clrMapOvr>
+  <p:transition spd="med" advClick="0" advTm="10000"/>
+</p:sld>
+</file>
+
+<file path=ppt/slides/slide3.xml><?xml version="1.0" encoding="utf-8"?>
+<p:sld xmlns:a="http://schemas.openxmlformats.org/drawingml/2006/main" xmlns:r="http://schemas.openxmlformats.org/officeDocument/2006/relationships" xmlns:p="http://schemas.openxmlformats.org/presentationml/2006/main">
+  <p:cSld>
+    <p:spTree>
+      <p:nvGrpSpPr>
+        <p:cNvPr id="1" name=""/>
+        <p:cNvGrpSpPr/>
+        <p:nvPr/>
+      </p:nvGrpSpPr>
+      <p:grpSpPr>
+        <a:xfrm>
+          <a:off x="0" y="0"/>
+          <a:ext cx="0" cy="0"/>
+          <a:chOff x="0" y="0"/>
+          <a:chExt cx="0" cy="0"/>
+        </a:xfrm>
+      </p:grpSpPr>
+      <p:sp>
+        <p:nvSpPr>
+          <p:cNvPr id="2" name="TextBox 1">
+            <a:extLst>
+              <a:ext uri="{FF2B5EF4-FFF2-40B4-BE49-F238E27FC236}">
+                <a16:creationId xmlns:a16="http://schemas.microsoft.com/office/drawing/2014/main" id="{2E572E4C-0056-8CD2-9BC3-E6BC32ED6B23}"/>
+              </a:ext>
+            </a:extLst>
+          </p:cNvPr>
+          <p:cNvSpPr txBox="1"/>
+          <p:nvPr/>
+        </p:nvSpPr>
+        <p:spPr>
+          <a:xfrm>
+            <a:off x="-1" y="967507"/>
+            <a:ext cx="18883423" cy="7623240"/>
+          </a:xfrm>
+          <a:prstGeom prst="rect">
+            <a:avLst/>
+          </a:prstGeom>
+          <a:solidFill>
+            <a:srgbClr val="FFFFFF">
+              <a:alpha val="50196"/>
+            </a:srgbClr>
+          </a:solidFill>
+          <a:ln w="12700" cap="flat">
+            <a:noFill/>
+            <a:miter lim="400000"/>
+          </a:ln>
+          <a:effectLst/>
+          <a:sp3d/>
+        </p:spPr>
+        <p:style>
+          <a:lnRef idx="0">
+            <a:scrgbClr r="0" g="0" b="0"/>
+          </a:lnRef>
+          <a:fillRef idx="0">
+            <a:scrgbClr r="0" g="0" b="0"/>
+          </a:fillRef>
+          <a:effectRef idx="0">
+            <a:scrgbClr r="0" g="0" b="0"/>
+          </a:effectRef>
+          <a:fontRef idx="none"/>
+        </p:style>
+        <p:txBody>
+          <a:bodyPr rot="0" spcFirstLastPara="1" vertOverflow="overflow" horzOverflow="overflow" vert="horz" wrap="square" lIns="71437" tIns="71437" rIns="71437" bIns="71437" numCol="1" spcCol="38100" rtlCol="0" anchor="ctr">
+            <a:spAutoFit/>
+          </a:bodyPr>
+          <a:lstStyle/>
+          <a:p>
+            <a:pPr marL="3600000" marR="0" indent="0" algn="l" defTabSz="584200" rtl="0" fontAlgn="auto" latinLnBrk="0" hangingPunct="0">
+              <a:lnSpc>
+                <a:spcPct val="100000"/>
+              </a:lnSpc>
+              <a:spcBef>
+                <a:spcPts val="0"/>
+              </a:spcBef>
+              <a:spcAft>
+                <a:spcPts val="0"/>
+              </a:spcAft>
+              <a:buClrTx/>
+              <a:buSzTx/>
+              <a:buFontTx/>
+              <a:buNone/>
+              <a:tabLst/>
+            </a:pPr>
+            <a:endParaRPr kumimoji="0" lang="en-US" sz="5800" b="1" i="0" u="none" strike="noStrike" cap="none" spc="0" normalizeH="0" baseline="0" dirty="0">
+              <a:ln>
+                <a:noFill/>
+              </a:ln>
+              <a:solidFill>
+                <a:schemeClr val="accent4"/>
+              </a:solidFill>
+              <a:effectLst/>
+              <a:uFillTx/>
+              <a:latin typeface="Gill Sans"/>
+              <a:ea typeface="Gill Sans"/>
+              <a:cs typeface="Gill Sans"/>
+              <a:sym typeface="Gill Sans"/>
+            </a:endParaRPr>
+          </a:p>
+          <a:p>
+            <a:pPr marL="3600000" marR="0" indent="0" algn="l" defTabSz="584200" rtl="0" fontAlgn="auto" latinLnBrk="0" hangingPunct="0">
+              <a:lnSpc>
+                <a:spcPct val="100000"/>
+              </a:lnSpc>
+              <a:spcBef>
+                <a:spcPts val="0"/>
+              </a:spcBef>
+              <a:spcAft>
+                <a:spcPts val="0"/>
+              </a:spcAft>
+              <a:buClrTx/>
+              <a:buSzTx/>
+              <a:buFontTx/>
+              <a:buNone/>
+              <a:tabLst/>
+            </a:pPr>
+            <a:r>
+              <a:rPr kumimoji="0" lang="en-US" sz="8000" b="1" i="0" u="none" strike="noStrike" cap="none" spc="0" normalizeH="0" baseline="0" dirty="0">
+                <a:ln>
+                  <a:noFill/>
+                </a:ln>
+                <a:solidFill>
+                  <a:schemeClr val="accent4"/>
+                </a:solidFill>
+                <a:effectLst/>
+                <a:uFillTx/>
+                <a:latin typeface="Gill Sans"/>
+                <a:ea typeface="Gill Sans"/>
+                <a:cs typeface="Gill Sans"/>
+                <a:sym typeface="Gill Sans"/>
+              </a:rPr>
+              <a:t>Download data</a:t>
+            </a:r>
+            <a:endParaRPr kumimoji="0" lang="en-US" sz="8000" b="1" i="0" u="none" strike="noStrike" cap="none" spc="0" normalizeH="0" baseline="0" dirty="0">
+              <a:ln>
+                <a:noFill/>
+              </a:ln>
+              <a:solidFill>
+                <a:schemeClr val="bg1"/>
+              </a:solidFill>
+              <a:effectLst/>
+              <a:uFillTx/>
+              <a:latin typeface="Gill Sans"/>
+              <a:ea typeface="Gill Sans"/>
+              <a:cs typeface="Gill Sans"/>
+              <a:sym typeface="Gill Sans"/>
+            </a:endParaRPr>
+          </a:p>
+          <a:p>
+            <a:pPr marL="3600000" marR="0" indent="0" algn="l" defTabSz="584200" rtl="0" fontAlgn="auto" latinLnBrk="0" hangingPunct="0">
+              <a:lnSpc>
+                <a:spcPct val="100000"/>
+              </a:lnSpc>
+              <a:spcBef>
+                <a:spcPts val="0"/>
+              </a:spcBef>
+              <a:spcAft>
+                <a:spcPts val="0"/>
+              </a:spcAft>
+              <a:buClrTx/>
+              <a:buSzTx/>
+              <a:buFontTx/>
+              <a:buNone/>
+              <a:tabLst/>
+            </a:pPr>
+            <a:endParaRPr kumimoji="0" lang="en-US" sz="5800" b="1" i="0" u="none" strike="noStrike" cap="none" spc="0" normalizeH="0" baseline="0" dirty="0">
+              <a:ln>
+                <a:noFill/>
+              </a:ln>
+              <a:solidFill>
+                <a:schemeClr val="bg1"/>
+              </a:solidFill>
+              <a:effectLst/>
+              <a:uFillTx/>
+              <a:latin typeface="Gill Sans"/>
+              <a:ea typeface="Gill Sans"/>
+              <a:cs typeface="Gill Sans"/>
+              <a:sym typeface="Gill Sans"/>
+            </a:endParaRPr>
+          </a:p>
+          <a:p>
+            <a:pPr marL="3600000" lvl="3" indent="-1143000" algn="l">
+              <a:buFont typeface="+mj-lt"/>
+              <a:buAutoNum type="arabicPeriod"/>
+            </a:pPr>
+            <a:r>
+              <a:rPr lang="en-US" b="1" dirty="0"/>
+              <a:t>Go to </a:t>
+            </a:r>
+            <a:r>
+              <a:rPr lang="en-US" b="1" dirty="0">
+                <a:hlinkClick r:id="rId2"/>
+              </a:rPr>
+              <a:t>https://bit.ly/bbk_R</a:t>
+            </a:r>
+            <a:r>
+              <a:rPr lang="en-US" b="1" dirty="0"/>
+              <a:t> </a:t>
+            </a:r>
+          </a:p>
+          <a:p>
+            <a:pPr marL="3600000" lvl="3" indent="-1143000" algn="l">
+              <a:buFont typeface="+mj-lt"/>
+              <a:buAutoNum type="arabicPeriod"/>
+            </a:pPr>
+            <a:r>
+              <a:rPr lang="en-US" b="1" dirty="0"/>
+              <a:t>Click on </a:t>
+            </a:r>
+            <a:r>
+              <a:rPr lang="en-US" b="1" dirty="0">
+                <a:solidFill>
+                  <a:schemeClr val="accent2"/>
+                </a:solidFill>
+              </a:rPr>
+              <a:t>&lt;&gt; Code</a:t>
+            </a:r>
+            <a:r>
+              <a:rPr lang="en-US" b="1" dirty="0"/>
+              <a:t> button</a:t>
+            </a:r>
+          </a:p>
+          <a:p>
+            <a:pPr marL="3600000" lvl="3" indent="-1143000" algn="l">
+              <a:buFont typeface="+mj-lt"/>
+              <a:buAutoNum type="arabicPeriod"/>
+            </a:pPr>
+            <a:r>
+              <a:rPr lang="en-US" b="1" dirty="0"/>
+              <a:t>Download ZIP </a:t>
+            </a:r>
+          </a:p>
+          <a:p>
+            <a:pPr marL="3600000" lvl="3" indent="-1143000" algn="l">
+              <a:buFont typeface="+mj-lt"/>
+              <a:buAutoNum type="arabicPeriod"/>
+            </a:pPr>
+            <a:r>
+              <a:rPr lang="en-US" b="1" dirty="0"/>
+              <a:t>Extract zip into folder!</a:t>
+            </a:r>
+          </a:p>
+          <a:p>
+            <a:pPr marL="3600000" lvl="3" indent="-1143000" algn="l">
+              <a:buFont typeface="+mj-lt"/>
+              <a:buAutoNum type="arabicPeriod"/>
+            </a:pPr>
+            <a:endParaRPr lang="en-US" b="1" dirty="0"/>
+          </a:p>
+        </p:txBody>
+      </p:sp>
+    </p:spTree>
+    <p:extLst>
+      <p:ext uri="{BB962C8B-B14F-4D97-AF65-F5344CB8AC3E}">
+        <p14:creationId xmlns:p14="http://schemas.microsoft.com/office/powerpoint/2010/main" val="4155338529"/>
       </p:ext>
     </p:extLst>
   </p:cSld>

</xml_diff>